<commit_message>
add a slides for paper discussion.
</commit_message>
<xml_diff>
--- a/paper_notes/DL_models/nlp/RNN_modeling/images/active_modules.pptx
+++ b/paper_notes/DL_models/nlp/RNN_modeling/images/active_modules.pptx
@@ -270,7 +270,7 @@
           <a:p>
             <a:fld id="{CFC8108C-54CC-F042-8730-2EF72E48F0E8}" type="datetimeFigureOut">
               <a:rPr kumimoji="1" lang="zh-CN" altLang="en-US" smtClean="0"/>
-              <a:t>2019/7/30</a:t>
+              <a:t>2019/8/8</a:t>
             </a:fld>
             <a:endParaRPr kumimoji="1" lang="zh-CN" altLang="en-US"/>
           </a:p>
@@ -443,7 +443,7 @@
           <a:p>
             <a:fld id="{CFC8108C-54CC-F042-8730-2EF72E48F0E8}" type="datetimeFigureOut">
               <a:rPr kumimoji="1" lang="zh-CN" altLang="en-US" smtClean="0"/>
-              <a:t>2019/7/30</a:t>
+              <a:t>2019/8/8</a:t>
             </a:fld>
             <a:endParaRPr kumimoji="1" lang="zh-CN" altLang="en-US"/>
           </a:p>
@@ -626,7 +626,7 @@
           <a:p>
             <a:fld id="{CFC8108C-54CC-F042-8730-2EF72E48F0E8}" type="datetimeFigureOut">
               <a:rPr kumimoji="1" lang="zh-CN" altLang="en-US" smtClean="0"/>
-              <a:t>2019/7/30</a:t>
+              <a:t>2019/8/8</a:t>
             </a:fld>
             <a:endParaRPr kumimoji="1" lang="zh-CN" altLang="en-US"/>
           </a:p>
@@ -799,7 +799,7 @@
           <a:p>
             <a:fld id="{CFC8108C-54CC-F042-8730-2EF72E48F0E8}" type="datetimeFigureOut">
               <a:rPr kumimoji="1" lang="zh-CN" altLang="en-US" smtClean="0"/>
-              <a:t>2019/7/30</a:t>
+              <a:t>2019/8/8</a:t>
             </a:fld>
             <a:endParaRPr kumimoji="1" lang="zh-CN" altLang="en-US"/>
           </a:p>
@@ -1077,7 +1077,7 @@
           <a:p>
             <a:fld id="{CFC8108C-54CC-F042-8730-2EF72E48F0E8}" type="datetimeFigureOut">
               <a:rPr kumimoji="1" lang="zh-CN" altLang="en-US" smtClean="0"/>
-              <a:t>2019/7/30</a:t>
+              <a:t>2019/8/8</a:t>
             </a:fld>
             <a:endParaRPr kumimoji="1" lang="zh-CN" altLang="en-US"/>
           </a:p>
@@ -1292,7 +1292,7 @@
           <a:p>
             <a:fld id="{CFC8108C-54CC-F042-8730-2EF72E48F0E8}" type="datetimeFigureOut">
               <a:rPr kumimoji="1" lang="zh-CN" altLang="en-US" smtClean="0"/>
-              <a:t>2019/7/30</a:t>
+              <a:t>2019/8/8</a:t>
             </a:fld>
             <a:endParaRPr kumimoji="1" lang="zh-CN" altLang="en-US"/>
           </a:p>
@@ -1660,7 +1660,7 @@
           <a:p>
             <a:fld id="{CFC8108C-54CC-F042-8730-2EF72E48F0E8}" type="datetimeFigureOut">
               <a:rPr kumimoji="1" lang="zh-CN" altLang="en-US" smtClean="0"/>
-              <a:t>2019/7/30</a:t>
+              <a:t>2019/8/8</a:t>
             </a:fld>
             <a:endParaRPr kumimoji="1" lang="zh-CN" altLang="en-US"/>
           </a:p>
@@ -1801,7 +1801,7 @@
           <a:p>
             <a:fld id="{CFC8108C-54CC-F042-8730-2EF72E48F0E8}" type="datetimeFigureOut">
               <a:rPr kumimoji="1" lang="zh-CN" altLang="en-US" smtClean="0"/>
-              <a:t>2019/7/30</a:t>
+              <a:t>2019/8/8</a:t>
             </a:fld>
             <a:endParaRPr kumimoji="1" lang="zh-CN" altLang="en-US"/>
           </a:p>
@@ -1914,7 +1914,7 @@
           <a:p>
             <a:fld id="{CFC8108C-54CC-F042-8730-2EF72E48F0E8}" type="datetimeFigureOut">
               <a:rPr kumimoji="1" lang="zh-CN" altLang="en-US" smtClean="0"/>
-              <a:t>2019/7/30</a:t>
+              <a:t>2019/8/8</a:t>
             </a:fld>
             <a:endParaRPr kumimoji="1" lang="zh-CN" altLang="en-US"/>
           </a:p>
@@ -2203,7 +2203,7 @@
           <a:p>
             <a:fld id="{CFC8108C-54CC-F042-8730-2EF72E48F0E8}" type="datetimeFigureOut">
               <a:rPr kumimoji="1" lang="zh-CN" altLang="en-US" smtClean="0"/>
-              <a:t>2019/7/30</a:t>
+              <a:t>2019/8/8</a:t>
             </a:fld>
             <a:endParaRPr kumimoji="1" lang="zh-CN" altLang="en-US"/>
           </a:p>
@@ -2494,7 +2494,7 @@
           <a:p>
             <a:fld id="{CFC8108C-54CC-F042-8730-2EF72E48F0E8}" type="datetimeFigureOut">
               <a:rPr kumimoji="1" lang="zh-CN" altLang="en-US" smtClean="0"/>
-              <a:t>2019/7/30</a:t>
+              <a:t>2019/8/8</a:t>
             </a:fld>
             <a:endParaRPr kumimoji="1" lang="zh-CN" altLang="en-US"/>
           </a:p>
@@ -2710,7 +2710,7 @@
           <a:p>
             <a:fld id="{CFC8108C-54CC-F042-8730-2EF72E48F0E8}" type="datetimeFigureOut">
               <a:rPr kumimoji="1" lang="zh-CN" altLang="en-US" smtClean="0"/>
-              <a:t>2019/7/30</a:t>
+              <a:t>2019/8/8</a:t>
             </a:fld>
             <a:endParaRPr kumimoji="1" lang="zh-CN" altLang="en-US"/>
           </a:p>
@@ -13421,7 +13421,7 @@
         <p:spPr>
           <a:xfrm>
             <a:off x="8802397" y="1790700"/>
-            <a:ext cx="1775622" cy="342900"/>
+            <a:ext cx="1446503" cy="342900"/>
           </a:xfrm>
           <a:prstGeom prst="rect">
             <a:avLst/>
@@ -13461,26 +13461,6 @@
                 <a:cs typeface="Calibri" panose="020F0502020204030204" pitchFamily="34" charset="0"/>
               </a:rPr>
               <a:t>Active</a:t>
-            </a:r>
-            <a:r>
-              <a:rPr kumimoji="1" lang="zh-CN" altLang="en-US" sz="1400" dirty="0">
-                <a:solidFill>
-                  <a:schemeClr val="tx1"/>
-                </a:solidFill>
-                <a:latin typeface="Calibri" panose="020F0502020204030204" pitchFamily="34" charset="0"/>
-                <a:cs typeface="Calibri" panose="020F0502020204030204" pitchFamily="34" charset="0"/>
-              </a:rPr>
-              <a:t> </a:t>
-            </a:r>
-            <a:r>
-              <a:rPr kumimoji="1" lang="en-US" altLang="zh-CN" sz="1400" dirty="0">
-                <a:solidFill>
-                  <a:schemeClr val="tx1"/>
-                </a:solidFill>
-                <a:latin typeface="Calibri" panose="020F0502020204030204" pitchFamily="34" charset="0"/>
-                <a:cs typeface="Calibri" panose="020F0502020204030204" pitchFamily="34" charset="0"/>
-              </a:rPr>
-              <a:t>time</a:t>
             </a:r>
             <a:r>
               <a:rPr kumimoji="1" lang="zh-CN" altLang="en-US" sz="1400" dirty="0">

</xml_diff>